<commit_message>
Added v0.3 files for PDF and PPT
</commit_message>
<xml_diff>
--- a/AgileDeliveryGrowthPack.pptx
+++ b/AgileDeliveryGrowthPack.pptx
@@ -265,7 +265,7 @@
           <a:p>
             <a:fld id="{A335F9F5-CEE3-E04F-927B-908CCF46869F}" type="datetimeFigureOut">
               <a:rPr lang="en-GB" smtClean="0"/>
-              <a:t>14/03/2024</a:t>
+              <a:t>03/11/2024</a:t>
             </a:fld>
             <a:endParaRPr lang="en-GB" dirty="0"/>
           </a:p>
@@ -463,7 +463,7 @@
           <a:p>
             <a:fld id="{A335F9F5-CEE3-E04F-927B-908CCF46869F}" type="datetimeFigureOut">
               <a:rPr lang="en-GB" smtClean="0"/>
-              <a:t>14/03/2024</a:t>
+              <a:t>03/11/2024</a:t>
             </a:fld>
             <a:endParaRPr lang="en-GB" dirty="0"/>
           </a:p>
@@ -671,7 +671,7 @@
           <a:p>
             <a:fld id="{A335F9F5-CEE3-E04F-927B-908CCF46869F}" type="datetimeFigureOut">
               <a:rPr lang="en-GB" smtClean="0"/>
-              <a:t>14/03/2024</a:t>
+              <a:t>03/11/2024</a:t>
             </a:fld>
             <a:endParaRPr lang="en-GB" dirty="0"/>
           </a:p>
@@ -1012,7 +1012,7 @@
           <a:p>
             <a:fld id="{A335F9F5-CEE3-E04F-927B-908CCF46869F}" type="datetimeFigureOut">
               <a:rPr lang="en-GB" smtClean="0"/>
-              <a:t>14/03/2024</a:t>
+              <a:t>03/11/2024</a:t>
             </a:fld>
             <a:endParaRPr lang="en-GB" dirty="0"/>
           </a:p>
@@ -1287,7 +1287,7 @@
           <a:p>
             <a:fld id="{A335F9F5-CEE3-E04F-927B-908CCF46869F}" type="datetimeFigureOut">
               <a:rPr lang="en-GB" smtClean="0"/>
-              <a:t>14/03/2024</a:t>
+              <a:t>03/11/2024</a:t>
             </a:fld>
             <a:endParaRPr lang="en-GB" dirty="0"/>
           </a:p>
@@ -1552,7 +1552,7 @@
           <a:p>
             <a:fld id="{A335F9F5-CEE3-E04F-927B-908CCF46869F}" type="datetimeFigureOut">
               <a:rPr lang="en-GB" smtClean="0"/>
-              <a:t>14/03/2024</a:t>
+              <a:t>03/11/2024</a:t>
             </a:fld>
             <a:endParaRPr lang="en-GB" dirty="0"/>
           </a:p>
@@ -1964,7 +1964,7 @@
           <a:p>
             <a:fld id="{A335F9F5-CEE3-E04F-927B-908CCF46869F}" type="datetimeFigureOut">
               <a:rPr lang="en-GB" smtClean="0"/>
-              <a:t>14/03/2024</a:t>
+              <a:t>03/11/2024</a:t>
             </a:fld>
             <a:endParaRPr lang="en-GB" dirty="0"/>
           </a:p>
@@ -2105,7 +2105,7 @@
           <a:p>
             <a:fld id="{A335F9F5-CEE3-E04F-927B-908CCF46869F}" type="datetimeFigureOut">
               <a:rPr lang="en-GB" smtClean="0"/>
-              <a:t>14/03/2024</a:t>
+              <a:t>03/11/2024</a:t>
             </a:fld>
             <a:endParaRPr lang="en-GB" dirty="0"/>
           </a:p>
@@ -2218,7 +2218,7 @@
           <a:p>
             <a:fld id="{A335F9F5-CEE3-E04F-927B-908CCF46869F}" type="datetimeFigureOut">
               <a:rPr lang="en-GB" smtClean="0"/>
-              <a:t>14/03/2024</a:t>
+              <a:t>03/11/2024</a:t>
             </a:fld>
             <a:endParaRPr lang="en-GB" dirty="0"/>
           </a:p>
@@ -2529,7 +2529,7 @@
           <a:p>
             <a:fld id="{A335F9F5-CEE3-E04F-927B-908CCF46869F}" type="datetimeFigureOut">
               <a:rPr lang="en-GB" smtClean="0"/>
-              <a:t>14/03/2024</a:t>
+              <a:t>03/11/2024</a:t>
             </a:fld>
             <a:endParaRPr lang="en-GB" dirty="0"/>
           </a:p>
@@ -2817,7 +2817,7 @@
           <a:p>
             <a:fld id="{A335F9F5-CEE3-E04F-927B-908CCF46869F}" type="datetimeFigureOut">
               <a:rPr lang="en-GB" smtClean="0"/>
-              <a:t>14/03/2024</a:t>
+              <a:t>03/11/2024</a:t>
             </a:fld>
             <a:endParaRPr lang="en-GB" dirty="0"/>
           </a:p>
@@ -3058,7 +3058,7 @@
           <a:p>
             <a:fld id="{A335F9F5-CEE3-E04F-927B-908CCF46869F}" type="datetimeFigureOut">
               <a:rPr lang="en-GB" smtClean="0"/>
-              <a:t>14/03/2024</a:t>
+              <a:t>03/11/2024</a:t>
             </a:fld>
             <a:endParaRPr lang="en-GB" dirty="0"/>
           </a:p>
@@ -6356,7 +6356,7 @@
                 <a:latin typeface="Arial" panose="020B0604020202020204" pitchFamily="34" charset="0"/>
                 <a:cs typeface="Arial" panose="020B0604020202020204" pitchFamily="34" charset="0"/>
               </a:rPr>
-              <a:t>Author: Tom Hoyland | Version 0.2</a:t>
+              <a:t>Author: Tom Hoyland | Version 0.3</a:t>
             </a:r>
           </a:p>
         </p:txBody>
@@ -7475,7 +7475,7 @@
                 <a:latin typeface="Arial" panose="020B0604020202020204" pitchFamily="34" charset="0"/>
                 <a:cs typeface="Arial" panose="020B0604020202020204" pitchFamily="34" charset="0"/>
               </a:rPr>
-              <a:t>Author: Tom Hoyland | Version 0.2</a:t>
+              <a:t>Author: Tom Hoyland | Version 0.3</a:t>
             </a:r>
           </a:p>
         </p:txBody>
@@ -7599,6 +7599,53 @@
           <a:chExt cx="0" cy="0"/>
         </a:xfrm>
       </p:grpSpPr>
+      <p:pic>
+        <p:nvPicPr>
+          <p:cNvPr id="1028" name="Picture 4">
+            <a:extLst>
+              <a:ext uri="{FF2B5EF4-FFF2-40B4-BE49-F238E27FC236}">
+                <a16:creationId xmlns:a16="http://schemas.microsoft.com/office/drawing/2014/main" id="{BC4A1D14-D089-F8D1-E9D8-FC2EC32DC53D}"/>
+              </a:ext>
+            </a:extLst>
+          </p:cNvPr>
+          <p:cNvPicPr>
+            <a:picLocks noGrp="1" noRot="1" noChangeAspect="1" noMove="1" noResize="1" noEditPoints="1" noAdjustHandles="1" noChangeArrowheads="1" noChangeShapeType="1" noCrop="1"/>
+          </p:cNvPicPr>
+          <p:nvPr/>
+        </p:nvPicPr>
+        <p:blipFill>
+          <a:blip r:embed="rId2">
+            <a:extLst>
+              <a:ext uri="{28A0092B-C50C-407E-A947-70E740481C1C}">
+                <a14:useLocalDpi xmlns:a14="http://schemas.microsoft.com/office/drawing/2010/main" val="0"/>
+              </a:ext>
+            </a:extLst>
+          </a:blip>
+          <a:srcRect/>
+          <a:stretch>
+            <a:fillRect/>
+          </a:stretch>
+        </p:blipFill>
+        <p:spPr bwMode="auto">
+          <a:xfrm>
+            <a:off x="6505172" y="1117073"/>
+            <a:ext cx="5142056" cy="5130181"/>
+          </a:xfrm>
+          <a:prstGeom prst="rect">
+            <a:avLst/>
+          </a:prstGeom>
+          <a:noFill/>
+          <a:extLst>
+            <a:ext uri="{909E8E84-426E-40DD-AFC4-6F175D3DCCD1}">
+              <a14:hiddenFill xmlns:a14="http://schemas.microsoft.com/office/drawing/2010/main">
+                <a:solidFill>
+                  <a:srgbClr val="FFFFFF"/>
+                </a:solidFill>
+              </a14:hiddenFill>
+            </a:ext>
+          </a:extLst>
+        </p:spPr>
+      </p:pic>
       <p:sp>
         <p:nvSpPr>
           <p:cNvPr id="2" name="Title 1">
@@ -7907,60 +7954,6 @@
       </p:sp>
       <p:sp>
         <p:nvSpPr>
-          <p:cNvPr id="12" name="Oval 11">
-            <a:extLst>
-              <a:ext uri="{FF2B5EF4-FFF2-40B4-BE49-F238E27FC236}">
-                <a16:creationId xmlns:a16="http://schemas.microsoft.com/office/drawing/2014/main" id="{5226400C-084D-041D-6C7D-128949C3FBEE}"/>
-              </a:ext>
-            </a:extLst>
-          </p:cNvPr>
-          <p:cNvSpPr>
-            <a:spLocks noChangeAspect="1"/>
-          </p:cNvSpPr>
-          <p:nvPr/>
-        </p:nvSpPr>
-        <p:spPr>
-          <a:xfrm>
-            <a:off x="4468748" y="2686478"/>
-            <a:ext cx="276318" cy="276318"/>
-          </a:xfrm>
-          <a:prstGeom prst="ellipse">
-            <a:avLst/>
-          </a:prstGeom>
-          <a:solidFill>
-            <a:srgbClr val="FA05EC"/>
-          </a:solidFill>
-          <a:ln>
-            <a:noFill/>
-          </a:ln>
-        </p:spPr>
-        <p:style>
-          <a:lnRef idx="2">
-            <a:schemeClr val="accent1">
-              <a:shade val="50000"/>
-            </a:schemeClr>
-          </a:lnRef>
-          <a:fillRef idx="1">
-            <a:schemeClr val="accent1"/>
-          </a:fillRef>
-          <a:effectRef idx="0">
-            <a:schemeClr val="accent1"/>
-          </a:effectRef>
-          <a:fontRef idx="minor">
-            <a:schemeClr val="lt1"/>
-          </a:fontRef>
-        </p:style>
-        <p:txBody>
-          <a:bodyPr rtlCol="0" anchor="ctr"/>
-          <a:lstStyle/>
-          <a:p>
-            <a:pPr algn="ctr"/>
-            <a:endParaRPr lang="en-GB" dirty="0"/>
-          </a:p>
-        </p:txBody>
-      </p:sp>
-      <p:sp>
-        <p:nvSpPr>
           <p:cNvPr id="13" name="Oval 12">
             <a:extLst>
               <a:ext uri="{FF2B5EF4-FFF2-40B4-BE49-F238E27FC236}">
@@ -8231,60 +8224,6 @@
       </p:sp>
       <p:sp>
         <p:nvSpPr>
-          <p:cNvPr id="18" name="Oval 17">
-            <a:extLst>
-              <a:ext uri="{FF2B5EF4-FFF2-40B4-BE49-F238E27FC236}">
-                <a16:creationId xmlns:a16="http://schemas.microsoft.com/office/drawing/2014/main" id="{4D246590-2E2A-213B-4C84-0656BA955005}"/>
-              </a:ext>
-            </a:extLst>
-          </p:cNvPr>
-          <p:cNvSpPr>
-            <a:spLocks noChangeAspect="1"/>
-          </p:cNvSpPr>
-          <p:nvPr/>
-        </p:nvSpPr>
-        <p:spPr>
-          <a:xfrm>
-            <a:off x="5037450" y="3719555"/>
-            <a:ext cx="276318" cy="276318"/>
-          </a:xfrm>
-          <a:prstGeom prst="ellipse">
-            <a:avLst/>
-          </a:prstGeom>
-          <a:solidFill>
-            <a:srgbClr val="FA05EC"/>
-          </a:solidFill>
-          <a:ln>
-            <a:noFill/>
-          </a:ln>
-        </p:spPr>
-        <p:style>
-          <a:lnRef idx="2">
-            <a:schemeClr val="accent1">
-              <a:shade val="50000"/>
-            </a:schemeClr>
-          </a:lnRef>
-          <a:fillRef idx="1">
-            <a:schemeClr val="accent1"/>
-          </a:fillRef>
-          <a:effectRef idx="0">
-            <a:schemeClr val="accent1"/>
-          </a:effectRef>
-          <a:fontRef idx="minor">
-            <a:schemeClr val="lt1"/>
-          </a:fontRef>
-        </p:style>
-        <p:txBody>
-          <a:bodyPr rtlCol="0" anchor="ctr"/>
-          <a:lstStyle/>
-          <a:p>
-            <a:pPr algn="ctr"/>
-            <a:endParaRPr lang="en-GB" dirty="0"/>
-          </a:p>
-        </p:txBody>
-      </p:sp>
-      <p:sp>
-        <p:nvSpPr>
           <p:cNvPr id="19" name="TextBox 18">
             <a:extLst>
               <a:ext uri="{FF2B5EF4-FFF2-40B4-BE49-F238E27FC236}">
@@ -8517,60 +8456,6 @@
         <p:spPr>
           <a:xfrm>
             <a:off x="5190759" y="5057192"/>
-            <a:ext cx="276318" cy="276318"/>
-          </a:xfrm>
-          <a:prstGeom prst="ellipse">
-            <a:avLst/>
-          </a:prstGeom>
-          <a:solidFill>
-            <a:schemeClr val="accent4"/>
-          </a:solidFill>
-          <a:ln>
-            <a:noFill/>
-          </a:ln>
-        </p:spPr>
-        <p:style>
-          <a:lnRef idx="2">
-            <a:schemeClr val="accent1">
-              <a:shade val="50000"/>
-            </a:schemeClr>
-          </a:lnRef>
-          <a:fillRef idx="1">
-            <a:schemeClr val="accent1"/>
-          </a:fillRef>
-          <a:effectRef idx="0">
-            <a:schemeClr val="accent1"/>
-          </a:effectRef>
-          <a:fontRef idx="minor">
-            <a:schemeClr val="lt1"/>
-          </a:fontRef>
-        </p:style>
-        <p:txBody>
-          <a:bodyPr rtlCol="0" anchor="ctr"/>
-          <a:lstStyle/>
-          <a:p>
-            <a:pPr algn="ctr"/>
-            <a:endParaRPr lang="en-GB" dirty="0"/>
-          </a:p>
-        </p:txBody>
-      </p:sp>
-      <p:sp>
-        <p:nvSpPr>
-          <p:cNvPr id="24" name="Oval 23">
-            <a:extLst>
-              <a:ext uri="{FF2B5EF4-FFF2-40B4-BE49-F238E27FC236}">
-                <a16:creationId xmlns:a16="http://schemas.microsoft.com/office/drawing/2014/main" id="{C8CCB9F9-6444-A158-239C-3FBA975B080E}"/>
-              </a:ext>
-            </a:extLst>
-          </p:cNvPr>
-          <p:cNvSpPr>
-            <a:spLocks noChangeAspect="1"/>
-          </p:cNvSpPr>
-          <p:nvPr/>
-        </p:nvSpPr>
-        <p:spPr>
-          <a:xfrm>
-            <a:off x="4889661" y="4782413"/>
             <a:ext cx="276318" cy="276318"/>
           </a:xfrm>
           <a:prstGeom prst="ellipse">
@@ -9057,7 +8942,7 @@
                 <a:effectLst/>
                 <a:latin typeface="Arial" panose="020B0604020202020204" pitchFamily="34" charset="0"/>
                 <a:cs typeface="Arial" panose="020B0604020202020204" pitchFamily="34" charset="0"/>
-                <a:hlinkClick r:id="rId2"/>
+                <a:hlinkClick r:id="rId3"/>
               </a:rPr>
               <a:t>https://agilecoachinggrowthwheel.org/</a:t>
             </a:r>
@@ -9158,53 +9043,6 @@
           </a:p>
         </p:txBody>
       </p:sp>
-      <p:pic>
-        <p:nvPicPr>
-          <p:cNvPr id="1028" name="Picture 4">
-            <a:extLst>
-              <a:ext uri="{FF2B5EF4-FFF2-40B4-BE49-F238E27FC236}">
-                <a16:creationId xmlns:a16="http://schemas.microsoft.com/office/drawing/2014/main" id="{BC4A1D14-D089-F8D1-E9D8-FC2EC32DC53D}"/>
-              </a:ext>
-            </a:extLst>
-          </p:cNvPr>
-          <p:cNvPicPr>
-            <a:picLocks noGrp="1" noRot="1" noChangeAspect="1" noMove="1" noResize="1" noEditPoints="1" noAdjustHandles="1" noChangeArrowheads="1" noChangeShapeType="1" noCrop="1"/>
-          </p:cNvPicPr>
-          <p:nvPr/>
-        </p:nvPicPr>
-        <p:blipFill>
-          <a:blip r:embed="rId3">
-            <a:extLst>
-              <a:ext uri="{28A0092B-C50C-407E-A947-70E740481C1C}">
-                <a14:useLocalDpi xmlns:a14="http://schemas.microsoft.com/office/drawing/2010/main" val="0"/>
-              </a:ext>
-            </a:extLst>
-          </a:blip>
-          <a:srcRect/>
-          <a:stretch>
-            <a:fillRect/>
-          </a:stretch>
-        </p:blipFill>
-        <p:spPr bwMode="auto">
-          <a:xfrm>
-            <a:off x="6505172" y="1117073"/>
-            <a:ext cx="5142056" cy="5130181"/>
-          </a:xfrm>
-          <a:prstGeom prst="rect">
-            <a:avLst/>
-          </a:prstGeom>
-          <a:noFill/>
-          <a:extLst>
-            <a:ext uri="{909E8E84-426E-40DD-AFC4-6F175D3DCCD1}">
-              <a14:hiddenFill xmlns:a14="http://schemas.microsoft.com/office/drawing/2010/main">
-                <a:solidFill>
-                  <a:srgbClr val="FFFFFF"/>
-                </a:solidFill>
-              </a14:hiddenFill>
-            </a:ext>
-          </a:extLst>
-        </p:spPr>
-      </p:pic>
       <p:sp>
         <p:nvSpPr>
           <p:cNvPr id="3" name="Rectangle 2">
@@ -9294,7 +9132,7 @@
                 <a:latin typeface="Arial" panose="020B0604020202020204" pitchFamily="34" charset="0"/>
                 <a:cs typeface="Arial" panose="020B0604020202020204" pitchFamily="34" charset="0"/>
               </a:rPr>
-              <a:t>Author: Tom Hoyland | Version 0.2</a:t>
+              <a:t>Author: Tom Hoyland | Version 0.3</a:t>
             </a:r>
           </a:p>
         </p:txBody>
@@ -9385,6 +9223,206 @@
               </a:rPr>
               <a:t>Agile Delivery Growth Pack</a:t>
             </a:r>
+          </a:p>
+        </p:txBody>
+      </p:sp>
+      <p:sp>
+        <p:nvSpPr>
+          <p:cNvPr id="12" name="Oval 11">
+            <a:extLst>
+              <a:ext uri="{FF2B5EF4-FFF2-40B4-BE49-F238E27FC236}">
+                <a16:creationId xmlns:a16="http://schemas.microsoft.com/office/drawing/2014/main" id="{5226400C-084D-041D-6C7D-128949C3FBEE}"/>
+              </a:ext>
+            </a:extLst>
+          </p:cNvPr>
+          <p:cNvSpPr>
+            <a:spLocks noChangeAspect="1"/>
+          </p:cNvSpPr>
+          <p:nvPr/>
+        </p:nvSpPr>
+        <p:spPr>
+          <a:xfrm>
+            <a:off x="10209810" y="4812475"/>
+            <a:ext cx="276318" cy="276318"/>
+          </a:xfrm>
+          <a:prstGeom prst="ellipse">
+            <a:avLst/>
+          </a:prstGeom>
+          <a:solidFill>
+            <a:srgbClr val="FA05EC"/>
+          </a:solidFill>
+          <a:ln>
+            <a:noFill/>
+          </a:ln>
+        </p:spPr>
+        <p:style>
+          <a:lnRef idx="2">
+            <a:schemeClr val="accent1">
+              <a:shade val="50000"/>
+            </a:schemeClr>
+          </a:lnRef>
+          <a:fillRef idx="1">
+            <a:schemeClr val="accent1"/>
+          </a:fillRef>
+          <a:effectRef idx="0">
+            <a:schemeClr val="accent1"/>
+          </a:effectRef>
+          <a:fontRef idx="minor">
+            <a:schemeClr val="lt1"/>
+          </a:fontRef>
+        </p:style>
+        <p:txBody>
+          <a:bodyPr rtlCol="0" anchor="ctr"/>
+          <a:lstStyle/>
+          <a:p>
+            <a:pPr algn="ctr"/>
+            <a:endParaRPr lang="en-GB" dirty="0"/>
+          </a:p>
+        </p:txBody>
+      </p:sp>
+      <p:sp>
+        <p:nvSpPr>
+          <p:cNvPr id="24" name="Oval 23">
+            <a:extLst>
+              <a:ext uri="{FF2B5EF4-FFF2-40B4-BE49-F238E27FC236}">
+                <a16:creationId xmlns:a16="http://schemas.microsoft.com/office/drawing/2014/main" id="{C8CCB9F9-6444-A158-239C-3FBA975B080E}"/>
+              </a:ext>
+            </a:extLst>
+          </p:cNvPr>
+          <p:cNvSpPr>
+            <a:spLocks noChangeAspect="1"/>
+          </p:cNvSpPr>
+          <p:nvPr/>
+        </p:nvSpPr>
+        <p:spPr>
+          <a:xfrm>
+            <a:off x="10486128" y="5029763"/>
+            <a:ext cx="276318" cy="276318"/>
+          </a:xfrm>
+          <a:prstGeom prst="ellipse">
+            <a:avLst/>
+          </a:prstGeom>
+          <a:solidFill>
+            <a:schemeClr val="accent4"/>
+          </a:solidFill>
+          <a:ln>
+            <a:noFill/>
+          </a:ln>
+        </p:spPr>
+        <p:style>
+          <a:lnRef idx="2">
+            <a:schemeClr val="accent1">
+              <a:shade val="50000"/>
+            </a:schemeClr>
+          </a:lnRef>
+          <a:fillRef idx="1">
+            <a:schemeClr val="accent1"/>
+          </a:fillRef>
+          <a:effectRef idx="0">
+            <a:schemeClr val="accent1"/>
+          </a:effectRef>
+          <a:fontRef idx="minor">
+            <a:schemeClr val="lt1"/>
+          </a:fontRef>
+        </p:style>
+        <p:txBody>
+          <a:bodyPr rtlCol="0" anchor="ctr"/>
+          <a:lstStyle/>
+          <a:p>
+            <a:pPr algn="ctr"/>
+            <a:endParaRPr lang="en-GB" dirty="0"/>
+          </a:p>
+        </p:txBody>
+      </p:sp>
+      <p:cxnSp>
+        <p:nvCxnSpPr>
+          <p:cNvPr id="34" name="Straight Connector 33">
+            <a:extLst>
+              <a:ext uri="{FF2B5EF4-FFF2-40B4-BE49-F238E27FC236}">
+                <a16:creationId xmlns:a16="http://schemas.microsoft.com/office/drawing/2014/main" id="{A3848246-EF75-AE75-FBD0-D73965C678C7}"/>
+              </a:ext>
+            </a:extLst>
+          </p:cNvPr>
+          <p:cNvCxnSpPr>
+            <a:cxnSpLocks/>
+          </p:cNvCxnSpPr>
+          <p:nvPr/>
+        </p:nvCxnSpPr>
+        <p:spPr>
+          <a:xfrm>
+            <a:off x="10185896" y="4826095"/>
+            <a:ext cx="503159" cy="443765"/>
+          </a:xfrm>
+          <a:prstGeom prst="line">
+            <a:avLst/>
+          </a:prstGeom>
+        </p:spPr>
+        <p:style>
+          <a:lnRef idx="1">
+            <a:schemeClr val="accent1"/>
+          </a:lnRef>
+          <a:fillRef idx="0">
+            <a:schemeClr val="accent1"/>
+          </a:fillRef>
+          <a:effectRef idx="0">
+            <a:schemeClr val="accent1"/>
+          </a:effectRef>
+          <a:fontRef idx="minor">
+            <a:schemeClr val="tx1"/>
+          </a:fontRef>
+        </p:style>
+      </p:cxnSp>
+      <p:sp>
+        <p:nvSpPr>
+          <p:cNvPr id="18" name="Oval 17">
+            <a:extLst>
+              <a:ext uri="{FF2B5EF4-FFF2-40B4-BE49-F238E27FC236}">
+                <a16:creationId xmlns:a16="http://schemas.microsoft.com/office/drawing/2014/main" id="{4D246590-2E2A-213B-4C84-0656BA955005}"/>
+              </a:ext>
+            </a:extLst>
+          </p:cNvPr>
+          <p:cNvSpPr>
+            <a:spLocks noChangeAspect="1"/>
+          </p:cNvSpPr>
+          <p:nvPr/>
+        </p:nvSpPr>
+        <p:spPr>
+          <a:xfrm>
+            <a:off x="9885276" y="2821425"/>
+            <a:ext cx="276318" cy="276318"/>
+          </a:xfrm>
+          <a:prstGeom prst="ellipse">
+            <a:avLst/>
+          </a:prstGeom>
+          <a:solidFill>
+            <a:srgbClr val="FA05EC"/>
+          </a:solidFill>
+          <a:ln>
+            <a:noFill/>
+          </a:ln>
+        </p:spPr>
+        <p:style>
+          <a:lnRef idx="2">
+            <a:schemeClr val="accent1">
+              <a:shade val="50000"/>
+            </a:schemeClr>
+          </a:lnRef>
+          <a:fillRef idx="1">
+            <a:schemeClr val="accent1"/>
+          </a:fillRef>
+          <a:effectRef idx="0">
+            <a:schemeClr val="accent1"/>
+          </a:effectRef>
+          <a:fontRef idx="minor">
+            <a:schemeClr val="lt1"/>
+          </a:fontRef>
+        </p:style>
+        <p:txBody>
+          <a:bodyPr rtlCol="0" anchor="ctr"/>
+          <a:lstStyle/>
+          <a:p>
+            <a:pPr algn="ctr"/>
+            <a:endParaRPr lang="en-GB" dirty="0"/>
           </a:p>
         </p:txBody>
       </p:sp>
@@ -10011,7 +10049,7 @@
                 <a:latin typeface="Arial" panose="020B0604020202020204" pitchFamily="34" charset="0"/>
                 <a:cs typeface="Arial" panose="020B0604020202020204" pitchFamily="34" charset="0"/>
               </a:rPr>
-              <a:t>Author: Tom Hoyland | Version 0.2</a:t>
+              <a:t>Author: Tom Hoyland | Version 0.3</a:t>
             </a:r>
           </a:p>
         </p:txBody>
@@ -11130,10 +11168,10 @@
       </p:sp>
       <p:sp>
         <p:nvSpPr>
-          <p:cNvPr id="5" name="Rectangle 4">
-            <a:extLst>
-              <a:ext uri="{FF2B5EF4-FFF2-40B4-BE49-F238E27FC236}">
-                <a16:creationId xmlns:a16="http://schemas.microsoft.com/office/drawing/2014/main" id="{C918E206-19FB-BEE4-6DF3-70C654116BCE}"/>
+          <p:cNvPr id="3" name="Rectangle 2">
+            <a:extLst>
+              <a:ext uri="{FF2B5EF4-FFF2-40B4-BE49-F238E27FC236}">
+                <a16:creationId xmlns:a16="http://schemas.microsoft.com/office/drawing/2014/main" id="{3932998C-BA2C-C0BE-DE4F-2EB1E3997DC3}"/>
               </a:ext>
             </a:extLst>
           </p:cNvPr>
@@ -11142,7 +11180,190 @@
         </p:nvSpPr>
         <p:spPr>
           <a:xfrm>
-            <a:off x="579272" y="2745671"/>
+            <a:off x="0" y="-4322"/>
+            <a:ext cx="12192000" cy="249799"/>
+          </a:xfrm>
+          <a:prstGeom prst="rect">
+            <a:avLst/>
+          </a:prstGeom>
+          <a:solidFill>
+            <a:schemeClr val="tx1"/>
+          </a:solidFill>
+          <a:ln>
+            <a:noFill/>
+          </a:ln>
+        </p:spPr>
+        <p:style>
+          <a:lnRef idx="2">
+            <a:schemeClr val="accent1">
+              <a:shade val="15000"/>
+            </a:schemeClr>
+          </a:lnRef>
+          <a:fillRef idx="1">
+            <a:schemeClr val="accent1"/>
+          </a:fillRef>
+          <a:effectRef idx="0">
+            <a:schemeClr val="accent1"/>
+          </a:effectRef>
+          <a:fontRef idx="minor">
+            <a:schemeClr val="lt1"/>
+          </a:fontRef>
+        </p:style>
+        <p:txBody>
+          <a:bodyPr rtlCol="0" anchor="ctr"/>
+          <a:lstStyle/>
+          <a:p>
+            <a:pPr algn="ctr"/>
+            <a:endParaRPr lang="en-US" dirty="0"/>
+          </a:p>
+        </p:txBody>
+      </p:sp>
+      <p:sp>
+        <p:nvSpPr>
+          <p:cNvPr id="7" name="TextBox 6">
+            <a:extLst>
+              <a:ext uri="{FF2B5EF4-FFF2-40B4-BE49-F238E27FC236}">
+                <a16:creationId xmlns:a16="http://schemas.microsoft.com/office/drawing/2014/main" id="{D858B7FA-1CA3-4658-A781-9C96F4E36EA5}"/>
+              </a:ext>
+            </a:extLst>
+          </p:cNvPr>
+          <p:cNvSpPr txBox="1"/>
+          <p:nvPr/>
+        </p:nvSpPr>
+        <p:spPr>
+          <a:xfrm>
+            <a:off x="10023435" y="6574"/>
+            <a:ext cx="2139821" cy="215444"/>
+          </a:xfrm>
+          <a:prstGeom prst="rect">
+            <a:avLst/>
+          </a:prstGeom>
+          <a:noFill/>
+        </p:spPr>
+        <p:txBody>
+          <a:bodyPr wrap="square" anchor="ctr">
+            <a:spAutoFit/>
+          </a:bodyPr>
+          <a:lstStyle/>
+          <a:p>
+            <a:pPr algn="r"/>
+            <a:r>
+              <a:rPr lang="en-US" sz="800" dirty="0">
+                <a:solidFill>
+                  <a:schemeClr val="bg1"/>
+                </a:solidFill>
+                <a:latin typeface="Arial" panose="020B0604020202020204" pitchFamily="34" charset="0"/>
+                <a:cs typeface="Arial" panose="020B0604020202020204" pitchFamily="34" charset="0"/>
+              </a:rPr>
+              <a:t>Author: Tom Hoyland | Version 0.3</a:t>
+            </a:r>
+          </a:p>
+        </p:txBody>
+      </p:sp>
+      <p:pic>
+        <p:nvPicPr>
+          <p:cNvPr id="9" name="Picture 2">
+            <a:extLst>
+              <a:ext uri="{FF2B5EF4-FFF2-40B4-BE49-F238E27FC236}">
+                <a16:creationId xmlns:a16="http://schemas.microsoft.com/office/drawing/2014/main" id="{B51E01BF-A818-CDB7-DBE7-4A8232575B06}"/>
+              </a:ext>
+            </a:extLst>
+          </p:cNvPr>
+          <p:cNvPicPr>
+            <a:picLocks noChangeAspect="1" noChangeArrowheads="1"/>
+          </p:cNvPicPr>
+          <p:nvPr/>
+        </p:nvPicPr>
+        <p:blipFill>
+          <a:blip r:embed="rId2">
+            <a:extLst>
+              <a:ext uri="{28A0092B-C50C-407E-A947-70E740481C1C}">
+                <a14:useLocalDpi xmlns:a14="http://schemas.microsoft.com/office/drawing/2010/main" val="0"/>
+              </a:ext>
+            </a:extLst>
+          </a:blip>
+          <a:srcRect/>
+          <a:stretch>
+            <a:fillRect/>
+          </a:stretch>
+        </p:blipFill>
+        <p:spPr bwMode="auto">
+          <a:xfrm>
+            <a:off x="-6350" y="-8069"/>
+            <a:ext cx="713969" cy="249800"/>
+          </a:xfrm>
+          <a:prstGeom prst="rect">
+            <a:avLst/>
+          </a:prstGeom>
+          <a:noFill/>
+          <a:extLst>
+            <a:ext uri="{909E8E84-426E-40DD-AFC4-6F175D3DCCD1}">
+              <a14:hiddenFill xmlns:a14="http://schemas.microsoft.com/office/drawing/2010/main">
+                <a:solidFill>
+                  <a:srgbClr val="FFFFFF"/>
+                </a:solidFill>
+              </a14:hiddenFill>
+            </a:ext>
+          </a:extLst>
+        </p:spPr>
+      </p:pic>
+      <p:sp>
+        <p:nvSpPr>
+          <p:cNvPr id="10" name="TextBox 9">
+            <a:extLst>
+              <a:ext uri="{FF2B5EF4-FFF2-40B4-BE49-F238E27FC236}">
+                <a16:creationId xmlns:a16="http://schemas.microsoft.com/office/drawing/2014/main" id="{DECD38A0-4E89-5E58-596D-F6C15CF44A1F}"/>
+              </a:ext>
+            </a:extLst>
+          </p:cNvPr>
+          <p:cNvSpPr txBox="1"/>
+          <p:nvPr/>
+        </p:nvSpPr>
+        <p:spPr>
+          <a:xfrm>
+            <a:off x="701972" y="-11977"/>
+            <a:ext cx="1819729" cy="253916"/>
+          </a:xfrm>
+          <a:prstGeom prst="rect">
+            <a:avLst/>
+          </a:prstGeom>
+          <a:noFill/>
+        </p:spPr>
+        <p:txBody>
+          <a:bodyPr wrap="none" rtlCol="0">
+            <a:spAutoFit/>
+          </a:bodyPr>
+          <a:lstStyle/>
+          <a:p>
+            <a:r>
+              <a:rPr lang="en-GB" sz="1050" dirty="0">
+                <a:solidFill>
+                  <a:schemeClr val="bg1"/>
+                </a:solidFill>
+                <a:latin typeface="Arial" panose="020B0604020202020204" pitchFamily="34" charset="0"/>
+                <a:ea typeface="Roboto" panose="02000000000000000000" pitchFamily="2" charset="0"/>
+                <a:cs typeface="Arial" panose="020B0604020202020204" pitchFamily="34" charset="0"/>
+              </a:rPr>
+              <a:t>Agile Delivery Growth Pack</a:t>
+            </a:r>
+          </a:p>
+        </p:txBody>
+      </p:sp>
+      <p:sp>
+        <p:nvSpPr>
+          <p:cNvPr id="12" name="Rectangle 11">
+            <a:extLst>
+              <a:ext uri="{FF2B5EF4-FFF2-40B4-BE49-F238E27FC236}">
+                <a16:creationId xmlns:a16="http://schemas.microsoft.com/office/drawing/2014/main" id="{8A80845B-130E-628C-15DA-C3F745523FEB}"/>
+              </a:ext>
+            </a:extLst>
+          </p:cNvPr>
+          <p:cNvSpPr/>
+          <p:nvPr/>
+        </p:nvSpPr>
+        <p:spPr>
+          <a:xfrm>
+            <a:off x="2636672" y="2592932"/>
             <a:ext cx="1188000" cy="604800"/>
           </a:xfrm>
           <a:prstGeom prst="rect">
@@ -11188,29 +11409,17 @@
                 </a:solidFill>
                 <a:latin typeface="Comic Sans MS" panose="030F0902030302020204" pitchFamily="66" charset="0"/>
               </a:rPr>
-              <a:t>Your </a:t>
+              <a:t>ICF - PCC</a:t>
             </a:r>
           </a:p>
-          <a:p>
-            <a:pPr algn="ctr"/>
-            <a:r>
-              <a:rPr lang="en-GB" sz="800" dirty="0">
-                <a:solidFill>
-                  <a:schemeClr val="tx1"/>
-                </a:solidFill>
-                <a:latin typeface="Comic Sans MS" panose="030F0902030302020204" pitchFamily="66" charset="0"/>
-              </a:rPr>
-              <a:t>Idea</a:t>
-            </a:r>
-          </a:p>
-        </p:txBody>
-      </p:sp>
-      <p:sp>
-        <p:nvSpPr>
-          <p:cNvPr id="8" name="Rectangle 7">
-            <a:extLst>
-              <a:ext uri="{FF2B5EF4-FFF2-40B4-BE49-F238E27FC236}">
-                <a16:creationId xmlns:a16="http://schemas.microsoft.com/office/drawing/2014/main" id="{F535B50B-2416-3389-B6DD-259267745670}"/>
+        </p:txBody>
+      </p:sp>
+      <p:sp>
+        <p:nvSpPr>
+          <p:cNvPr id="13" name="Rectangle 12">
+            <a:extLst>
+              <a:ext uri="{FF2B5EF4-FFF2-40B4-BE49-F238E27FC236}">
+                <a16:creationId xmlns:a16="http://schemas.microsoft.com/office/drawing/2014/main" id="{6CD239A3-7C6C-5BCE-9AA8-B6471449DDC3}"/>
               </a:ext>
             </a:extLst>
           </p:cNvPr>
@@ -11284,10 +11493,10 @@
       </p:sp>
       <p:sp>
         <p:nvSpPr>
-          <p:cNvPr id="6" name="Rectangle 5">
-            <a:extLst>
-              <a:ext uri="{FF2B5EF4-FFF2-40B4-BE49-F238E27FC236}">
-                <a16:creationId xmlns:a16="http://schemas.microsoft.com/office/drawing/2014/main" id="{866C73F2-570C-E023-C9E0-33EB2CCB9390}"/>
+          <p:cNvPr id="14" name="Rectangle 13">
+            <a:extLst>
+              <a:ext uri="{FF2B5EF4-FFF2-40B4-BE49-F238E27FC236}">
+                <a16:creationId xmlns:a16="http://schemas.microsoft.com/office/drawing/2014/main" id="{EF09F563-0220-6700-1108-44018039B8CD}"/>
               </a:ext>
             </a:extLst>
           </p:cNvPr>
@@ -11361,10 +11570,10 @@
       </p:sp>
       <p:sp>
         <p:nvSpPr>
-          <p:cNvPr id="3" name="Rectangle 2">
-            <a:extLst>
-              <a:ext uri="{FF2B5EF4-FFF2-40B4-BE49-F238E27FC236}">
-                <a16:creationId xmlns:a16="http://schemas.microsoft.com/office/drawing/2014/main" id="{3932998C-BA2C-C0BE-DE4F-2EB1E3997DC3}"/>
+          <p:cNvPr id="15" name="Rectangle 14">
+            <a:extLst>
+              <a:ext uri="{FF2B5EF4-FFF2-40B4-BE49-F238E27FC236}">
+                <a16:creationId xmlns:a16="http://schemas.microsoft.com/office/drawing/2014/main" id="{9B9BC396-D6BE-EEBA-0AAF-DE17AEB13F67}"/>
               </a:ext>
             </a:extLst>
           </p:cNvPr>
@@ -11373,23 +11582,28 @@
         </p:nvSpPr>
         <p:spPr>
           <a:xfrm>
-            <a:off x="0" y="-4322"/>
-            <a:ext cx="12192000" cy="249799"/>
+            <a:off x="10038107" y="2440532"/>
+            <a:ext cx="1188000" cy="604800"/>
           </a:xfrm>
           <a:prstGeom prst="rect">
             <a:avLst/>
           </a:prstGeom>
           <a:solidFill>
-            <a:schemeClr val="tx1"/>
+            <a:schemeClr val="accent4">
+              <a:lumMod val="20000"/>
+              <a:lumOff val="80000"/>
+            </a:schemeClr>
           </a:solidFill>
           <a:ln>
-            <a:noFill/>
+            <a:solidFill>
+              <a:schemeClr val="tx1"/>
+            </a:solidFill>
           </a:ln>
         </p:spPr>
         <p:style>
           <a:lnRef idx="2">
             <a:schemeClr val="accent1">
-              <a:shade val="15000"/>
+              <a:shade val="50000"/>
             </a:schemeClr>
           </a:lnRef>
           <a:fillRef idx="1">
@@ -11407,137 +11621,224 @@
           <a:lstStyle/>
           <a:p>
             <a:pPr algn="ctr"/>
-            <a:endParaRPr lang="en-US" dirty="0"/>
-          </a:p>
-        </p:txBody>
-      </p:sp>
-      <p:sp>
-        <p:nvSpPr>
-          <p:cNvPr id="7" name="TextBox 6">
-            <a:extLst>
-              <a:ext uri="{FF2B5EF4-FFF2-40B4-BE49-F238E27FC236}">
-                <a16:creationId xmlns:a16="http://schemas.microsoft.com/office/drawing/2014/main" id="{D858B7FA-1CA3-4658-A781-9C96F4E36EA5}"/>
-              </a:ext>
-            </a:extLst>
-          </p:cNvPr>
-          <p:cNvSpPr txBox="1"/>
+            <a:r>
+              <a:rPr lang="en-GB" sz="800">
+                <a:solidFill>
+                  <a:schemeClr val="tx1"/>
+                </a:solidFill>
+                <a:latin typeface="Comic Sans MS" panose="030F0902030302020204" pitchFamily="66" charset="0"/>
+              </a:rPr>
+              <a:t>Clean Language</a:t>
+            </a:r>
+            <a:endParaRPr lang="en-GB" sz="800" dirty="0">
+              <a:solidFill>
+                <a:schemeClr val="tx1"/>
+              </a:solidFill>
+              <a:latin typeface="Comic Sans MS" panose="030F0902030302020204" pitchFamily="66" charset="0"/>
+            </a:endParaRPr>
+          </a:p>
+        </p:txBody>
+      </p:sp>
+      <p:sp>
+        <p:nvSpPr>
+          <p:cNvPr id="16" name="Rectangle 15">
+            <a:extLst>
+              <a:ext uri="{FF2B5EF4-FFF2-40B4-BE49-F238E27FC236}">
+                <a16:creationId xmlns:a16="http://schemas.microsoft.com/office/drawing/2014/main" id="{D66D4EAE-F24D-0989-E100-E20CB50B185E}"/>
+              </a:ext>
+            </a:extLst>
+          </p:cNvPr>
+          <p:cNvSpPr/>
           <p:nvPr/>
         </p:nvSpPr>
         <p:spPr>
           <a:xfrm>
-            <a:off x="10023435" y="6574"/>
-            <a:ext cx="2139821" cy="215444"/>
+            <a:off x="4503572" y="3638951"/>
+            <a:ext cx="1188000" cy="604800"/>
           </a:xfrm>
           <a:prstGeom prst="rect">
             <a:avLst/>
           </a:prstGeom>
-          <a:noFill/>
+          <a:solidFill>
+            <a:schemeClr val="accent4">
+              <a:lumMod val="20000"/>
+              <a:lumOff val="80000"/>
+            </a:schemeClr>
+          </a:solidFill>
+          <a:ln>
+            <a:solidFill>
+              <a:schemeClr val="tx1"/>
+            </a:solidFill>
+          </a:ln>
         </p:spPr>
-        <p:txBody>
-          <a:bodyPr wrap="square" anchor="ctr">
-            <a:spAutoFit/>
-          </a:bodyPr>
+        <p:style>
+          <a:lnRef idx="2">
+            <a:schemeClr val="accent1">
+              <a:shade val="50000"/>
+            </a:schemeClr>
+          </a:lnRef>
+          <a:fillRef idx="1">
+            <a:schemeClr val="accent1"/>
+          </a:fillRef>
+          <a:effectRef idx="0">
+            <a:schemeClr val="accent1"/>
+          </a:effectRef>
+          <a:fontRef idx="minor">
+            <a:schemeClr val="lt1"/>
+          </a:fontRef>
+        </p:style>
+        <p:txBody>
+          <a:bodyPr rtlCol="0" anchor="ctr"/>
           <a:lstStyle/>
           <a:p>
-            <a:pPr algn="r"/>
+            <a:pPr algn="ctr"/>
             <a:r>
-              <a:rPr lang="en-US" sz="800" dirty="0">
+              <a:rPr lang="en-GB" sz="800" dirty="0" err="1">
                 <a:solidFill>
-                  <a:schemeClr val="bg1"/>
+                  <a:schemeClr val="tx1"/>
                 </a:solidFill>
-                <a:latin typeface="Arial" panose="020B0604020202020204" pitchFamily="34" charset="0"/>
-                <a:cs typeface="Arial" panose="020B0604020202020204" pitchFamily="34" charset="0"/>
+                <a:latin typeface="Comic Sans MS" panose="030F0902030302020204" pitchFamily="66" charset="0"/>
               </a:rPr>
-              <a:t>Author: Tom Hoyland | Version 0.2</a:t>
+              <a:t>ICagile</a:t>
             </a:r>
-          </a:p>
-        </p:txBody>
-      </p:sp>
-      <p:pic>
-        <p:nvPicPr>
-          <p:cNvPr id="9" name="Picture 2">
-            <a:extLst>
-              <a:ext uri="{FF2B5EF4-FFF2-40B4-BE49-F238E27FC236}">
-                <a16:creationId xmlns:a16="http://schemas.microsoft.com/office/drawing/2014/main" id="{B51E01BF-A818-CDB7-DBE7-4A8232575B06}"/>
-              </a:ext>
-            </a:extLst>
-          </p:cNvPr>
-          <p:cNvPicPr>
-            <a:picLocks noChangeAspect="1" noChangeArrowheads="1"/>
-          </p:cNvPicPr>
+            <a:r>
+              <a:rPr lang="en-GB" sz="800" dirty="0">
+                <a:solidFill>
+                  <a:schemeClr val="tx1"/>
+                </a:solidFill>
+                <a:latin typeface="Comic Sans MS" panose="030F0902030302020204" pitchFamily="66" charset="0"/>
+              </a:rPr>
+              <a:t> Facilitation</a:t>
+            </a:r>
+          </a:p>
+        </p:txBody>
+      </p:sp>
+      <p:sp>
+        <p:nvSpPr>
+          <p:cNvPr id="17" name="Rectangle 16">
+            <a:extLst>
+              <a:ext uri="{FF2B5EF4-FFF2-40B4-BE49-F238E27FC236}">
+                <a16:creationId xmlns:a16="http://schemas.microsoft.com/office/drawing/2014/main" id="{A680FACE-6E31-3969-C685-A80A4BA69337}"/>
+              </a:ext>
+            </a:extLst>
+          </p:cNvPr>
+          <p:cNvSpPr/>
           <p:nvPr/>
-        </p:nvPicPr>
-        <p:blipFill>
-          <a:blip r:embed="rId2">
-            <a:extLst>
-              <a:ext uri="{28A0092B-C50C-407E-A947-70E740481C1C}">
-                <a14:useLocalDpi xmlns:a14="http://schemas.microsoft.com/office/drawing/2010/main" val="0"/>
-              </a:ext>
-            </a:extLst>
-          </a:blip>
-          <a:srcRect/>
-          <a:stretch>
-            <a:fillRect/>
-          </a:stretch>
-        </p:blipFill>
-        <p:spPr bwMode="auto">
+        </p:nvSpPr>
+        <p:spPr>
           <a:xfrm>
-            <a:off x="-6350" y="-8069"/>
-            <a:ext cx="713969" cy="249800"/>
+            <a:off x="8284914" y="2439016"/>
+            <a:ext cx="1188000" cy="604800"/>
           </a:xfrm>
           <a:prstGeom prst="rect">
             <a:avLst/>
           </a:prstGeom>
-          <a:noFill/>
-          <a:extLst>
-            <a:ext uri="{909E8E84-426E-40DD-AFC4-6F175D3DCCD1}">
-              <a14:hiddenFill xmlns:a14="http://schemas.microsoft.com/office/drawing/2010/main">
+          <a:solidFill>
+            <a:schemeClr val="accent4">
+              <a:lumMod val="20000"/>
+              <a:lumOff val="80000"/>
+            </a:schemeClr>
+          </a:solidFill>
+          <a:ln>
+            <a:solidFill>
+              <a:schemeClr val="tx1"/>
+            </a:solidFill>
+          </a:ln>
+        </p:spPr>
+        <p:style>
+          <a:lnRef idx="2">
+            <a:schemeClr val="accent1">
+              <a:shade val="50000"/>
+            </a:schemeClr>
+          </a:lnRef>
+          <a:fillRef idx="1">
+            <a:schemeClr val="accent1"/>
+          </a:fillRef>
+          <a:effectRef idx="0">
+            <a:schemeClr val="accent1"/>
+          </a:effectRef>
+          <a:fontRef idx="minor">
+            <a:schemeClr val="lt1"/>
+          </a:fontRef>
+        </p:style>
+        <p:txBody>
+          <a:bodyPr rtlCol="0" anchor="ctr"/>
+          <a:lstStyle/>
+          <a:p>
+            <a:pPr algn="ctr"/>
+            <a:r>
+              <a:rPr lang="en-GB" sz="800" dirty="0">
                 <a:solidFill>
-                  <a:srgbClr val="FFFFFF"/>
+                  <a:schemeClr val="tx1"/>
                 </a:solidFill>
-              </a14:hiddenFill>
-            </a:ext>
-          </a:extLst>
-        </p:spPr>
-      </p:pic>
-      <p:sp>
-        <p:nvSpPr>
-          <p:cNvPr id="10" name="TextBox 9">
-            <a:extLst>
-              <a:ext uri="{FF2B5EF4-FFF2-40B4-BE49-F238E27FC236}">
-                <a16:creationId xmlns:a16="http://schemas.microsoft.com/office/drawing/2014/main" id="{DECD38A0-4E89-5E58-596D-F6C15CF44A1F}"/>
-              </a:ext>
-            </a:extLst>
-          </p:cNvPr>
-          <p:cNvSpPr txBox="1"/>
+                <a:latin typeface="Comic Sans MS" panose="030F0902030302020204" pitchFamily="66" charset="0"/>
+              </a:rPr>
+              <a:t>Clean Updates</a:t>
+            </a:r>
+          </a:p>
+        </p:txBody>
+      </p:sp>
+      <p:sp>
+        <p:nvSpPr>
+          <p:cNvPr id="18" name="Rectangle 17">
+            <a:extLst>
+              <a:ext uri="{FF2B5EF4-FFF2-40B4-BE49-F238E27FC236}">
+                <a16:creationId xmlns:a16="http://schemas.microsoft.com/office/drawing/2014/main" id="{EB05A7A4-1AF8-232E-4EFD-74E1257F1E8B}"/>
+              </a:ext>
+            </a:extLst>
+          </p:cNvPr>
+          <p:cNvSpPr/>
           <p:nvPr/>
         </p:nvSpPr>
         <p:spPr>
           <a:xfrm>
-            <a:off x="701972" y="-11977"/>
-            <a:ext cx="1819729" cy="253916"/>
+            <a:off x="716909" y="2419271"/>
+            <a:ext cx="1188000" cy="604800"/>
           </a:xfrm>
           <a:prstGeom prst="rect">
             <a:avLst/>
           </a:prstGeom>
-          <a:noFill/>
+          <a:solidFill>
+            <a:schemeClr val="accent4">
+              <a:lumMod val="20000"/>
+              <a:lumOff val="80000"/>
+            </a:schemeClr>
+          </a:solidFill>
+          <a:ln>
+            <a:solidFill>
+              <a:schemeClr val="tx1"/>
+            </a:solidFill>
+          </a:ln>
         </p:spPr>
-        <p:txBody>
-          <a:bodyPr wrap="none" rtlCol="0">
-            <a:spAutoFit/>
-          </a:bodyPr>
+        <p:style>
+          <a:lnRef idx="2">
+            <a:schemeClr val="accent1">
+              <a:shade val="50000"/>
+            </a:schemeClr>
+          </a:lnRef>
+          <a:fillRef idx="1">
+            <a:schemeClr val="accent1"/>
+          </a:fillRef>
+          <a:effectRef idx="0">
+            <a:schemeClr val="accent1"/>
+          </a:effectRef>
+          <a:fontRef idx="minor">
+            <a:schemeClr val="lt1"/>
+          </a:fontRef>
+        </p:style>
+        <p:txBody>
+          <a:bodyPr rtlCol="0" anchor="ctr"/>
           <a:lstStyle/>
           <a:p>
+            <a:pPr algn="ctr"/>
             <a:r>
-              <a:rPr lang="en-GB" sz="1050" dirty="0">
+              <a:rPr lang="en-GB" sz="800" dirty="0">
                 <a:solidFill>
-                  <a:schemeClr val="bg1"/>
+                  <a:schemeClr val="tx1"/>
                 </a:solidFill>
-                <a:latin typeface="Arial" panose="020B0604020202020204" pitchFamily="34" charset="0"/>
-                <a:ea typeface="Roboto" panose="02000000000000000000" pitchFamily="2" charset="0"/>
-                <a:cs typeface="Arial" panose="020B0604020202020204" pitchFamily="34" charset="0"/>
+                <a:latin typeface="Comic Sans MS" panose="030F0902030302020204" pitchFamily="66" charset="0"/>
               </a:rPr>
-              <a:t>Agile Delivery Growth Pack</a:t>
+              <a:t>Scrum Alliance – CSP-SM</a:t>
             </a:r>
           </a:p>
         </p:txBody>
@@ -13127,7 +13428,7 @@
                 <a:latin typeface="Arial" panose="020B0604020202020204" pitchFamily="34" charset="0"/>
                 <a:cs typeface="Arial" panose="020B0604020202020204" pitchFamily="34" charset="0"/>
               </a:rPr>
-              <a:t>Author: Tom Hoyland | Version 0.2</a:t>
+              <a:t>Author: Tom Hoyland | Version 0.3</a:t>
             </a:r>
           </a:p>
         </p:txBody>

</xml_diff>